<commit_message>
fixed the caching issue with the icons.
</commit_message>
<xml_diff>
--- a/icons/icons.pptx
+++ b/icons/icons.pptx
@@ -104,7 +104,137 @@
       </a:defRPr>
     </a:lvl9pPr>
   </p:defaultTextStyle>
+  <p:extLst>
+    <p:ext uri="{EFAFB233-063F-42B5-8137-9DF3F51BA10A}">
+      <p15:sldGuideLst xmlns:p15="http://schemas.microsoft.com/office/powerpoint/2012/main"/>
+    </p:ext>
+  </p:extLst>
 </p:presentation>
+</file>
+
+<file path=ppt/revisionInfo.xml><?xml version="1.0" encoding="utf-8"?>
+<p1510:revInfo xmlns:a="http://schemas.openxmlformats.org/drawingml/2006/main" xmlns:r="http://schemas.openxmlformats.org/officeDocument/2006/relationships" xmlns:p1510="http://schemas.microsoft.com/office/powerpoint/2015/10/main">
+  <p1510:revLst>
+    <p1510:client id="{2A5AC9F9-D974-459D-82EB-E85FE98BCB28}" v="2" dt="2026-02-03T08:55:05.447"/>
+  </p1510:revLst>
+</p1510:revInfo>
+</file>
+
+<file path=ppt/changesInfos/changesInfo1.xml><?xml version="1.0" encoding="utf-8"?>
+<pc:chgInfo xmlns:a="http://schemas.openxmlformats.org/drawingml/2006/main" xmlns:r="http://schemas.openxmlformats.org/officeDocument/2006/relationships" xmlns:ac="http://schemas.microsoft.com/office/drawing/2013/main/command" xmlns:pc="http://schemas.microsoft.com/office/powerpoint/2013/main/command">
+  <pc:docChgLst>
+    <pc:chgData name="Bellu, Gowri Shanker" userId="e4b71a44-d6f9-4d3b-9b6e-2cadb6b1c0ec" providerId="ADAL" clId="{5FC56B7B-2AE1-48C6-AAA3-019F1F6B3F19}"/>
+    <pc:docChg chg="modSld">
+      <pc:chgData name="Bellu, Gowri Shanker" userId="e4b71a44-d6f9-4d3b-9b6e-2cadb6b1c0ec" providerId="ADAL" clId="{5FC56B7B-2AE1-48C6-AAA3-019F1F6B3F19}" dt="2026-02-03T08:55:09.145" v="6" actId="1076"/>
+      <pc:docMkLst>
+        <pc:docMk/>
+      </pc:docMkLst>
+      <pc:sldChg chg="addSp modSp mod">
+        <pc:chgData name="Bellu, Gowri Shanker" userId="e4b71a44-d6f9-4d3b-9b6e-2cadb6b1c0ec" providerId="ADAL" clId="{5FC56B7B-2AE1-48C6-AAA3-019F1F6B3F19}" dt="2026-02-03T08:55:09.145" v="6" actId="1076"/>
+        <pc:sldMkLst>
+          <pc:docMk/>
+          <pc:sldMk cId="546536083" sldId="256"/>
+        </pc:sldMkLst>
+        <pc:picChg chg="add mod">
+          <ac:chgData name="Bellu, Gowri Shanker" userId="e4b71a44-d6f9-4d3b-9b6e-2cadb6b1c0ec" providerId="ADAL" clId="{5FC56B7B-2AE1-48C6-AAA3-019F1F6B3F19}" dt="2026-02-03T08:55:07.904" v="5" actId="1076"/>
+          <ac:picMkLst>
+            <pc:docMk/>
+            <pc:sldMk cId="546536083" sldId="256"/>
+            <ac:picMk id="3" creationId="{A0294671-1C96-3E1D-4393-0B41C7F16D1A}"/>
+          </ac:picMkLst>
+        </pc:picChg>
+        <pc:picChg chg="add mod">
+          <ac:chgData name="Bellu, Gowri Shanker" userId="e4b71a44-d6f9-4d3b-9b6e-2cadb6b1c0ec" providerId="ADAL" clId="{5FC56B7B-2AE1-48C6-AAA3-019F1F6B3F19}" dt="2026-02-03T08:55:09.145" v="6" actId="1076"/>
+          <ac:picMkLst>
+            <pc:docMk/>
+            <pc:sldMk cId="546536083" sldId="256"/>
+            <ac:picMk id="5" creationId="{22E0B9E7-CAF3-9B8E-E3C8-8207F420AF07}"/>
+          </ac:picMkLst>
+        </pc:picChg>
+        <pc:picChg chg="mod">
+          <ac:chgData name="Bellu, Gowri Shanker" userId="e4b71a44-d6f9-4d3b-9b6e-2cadb6b1c0ec" providerId="ADAL" clId="{5FC56B7B-2AE1-48C6-AAA3-019F1F6B3F19}" dt="2026-02-03T08:52:23.412" v="0" actId="1076"/>
+          <ac:picMkLst>
+            <pc:docMk/>
+            <pc:sldMk cId="546536083" sldId="256"/>
+            <ac:picMk id="14" creationId="{A310A1E9-8742-F981-6D07-116495F6B5EE}"/>
+          </ac:picMkLst>
+        </pc:picChg>
+        <pc:picChg chg="mod">
+          <ac:chgData name="Bellu, Gowri Shanker" userId="e4b71a44-d6f9-4d3b-9b6e-2cadb6b1c0ec" providerId="ADAL" clId="{5FC56B7B-2AE1-48C6-AAA3-019F1F6B3F19}" dt="2026-02-03T08:52:23.412" v="0" actId="1076"/>
+          <ac:picMkLst>
+            <pc:docMk/>
+            <pc:sldMk cId="546536083" sldId="256"/>
+            <ac:picMk id="19" creationId="{221B5BE9-D234-D10A-4494-900F42C9C281}"/>
+          </ac:picMkLst>
+        </pc:picChg>
+        <pc:picChg chg="mod">
+          <ac:chgData name="Bellu, Gowri Shanker" userId="e4b71a44-d6f9-4d3b-9b6e-2cadb6b1c0ec" providerId="ADAL" clId="{5FC56B7B-2AE1-48C6-AAA3-019F1F6B3F19}" dt="2026-02-03T08:52:23.412" v="0" actId="1076"/>
+          <ac:picMkLst>
+            <pc:docMk/>
+            <pc:sldMk cId="546536083" sldId="256"/>
+            <ac:picMk id="20" creationId="{D105B543-5CC0-A3DC-4307-3C3F4810A125}"/>
+          </ac:picMkLst>
+        </pc:picChg>
+        <pc:picChg chg="mod">
+          <ac:chgData name="Bellu, Gowri Shanker" userId="e4b71a44-d6f9-4d3b-9b6e-2cadb6b1c0ec" providerId="ADAL" clId="{5FC56B7B-2AE1-48C6-AAA3-019F1F6B3F19}" dt="2026-02-03T08:52:23.412" v="0" actId="1076"/>
+          <ac:picMkLst>
+            <pc:docMk/>
+            <pc:sldMk cId="546536083" sldId="256"/>
+            <ac:picMk id="21" creationId="{99B0D6D1-2330-9FD7-1CF7-80F7A4FF54BC}"/>
+          </ac:picMkLst>
+        </pc:picChg>
+        <pc:picChg chg="mod">
+          <ac:chgData name="Bellu, Gowri Shanker" userId="e4b71a44-d6f9-4d3b-9b6e-2cadb6b1c0ec" providerId="ADAL" clId="{5FC56B7B-2AE1-48C6-AAA3-019F1F6B3F19}" dt="2026-02-03T08:52:23.412" v="0" actId="1076"/>
+          <ac:picMkLst>
+            <pc:docMk/>
+            <pc:sldMk cId="546536083" sldId="256"/>
+            <ac:picMk id="23" creationId="{699EFAA0-A7D8-DCC5-E3F4-FEBB1BE648C5}"/>
+          </ac:picMkLst>
+        </pc:picChg>
+        <pc:picChg chg="mod">
+          <ac:chgData name="Bellu, Gowri Shanker" userId="e4b71a44-d6f9-4d3b-9b6e-2cadb6b1c0ec" providerId="ADAL" clId="{5FC56B7B-2AE1-48C6-AAA3-019F1F6B3F19}" dt="2026-02-03T08:52:23.412" v="0" actId="1076"/>
+          <ac:picMkLst>
+            <pc:docMk/>
+            <pc:sldMk cId="546536083" sldId="256"/>
+            <ac:picMk id="35" creationId="{1310EA8F-EAD9-CC0C-8C9F-3E52CB736BF4}"/>
+          </ac:picMkLst>
+        </pc:picChg>
+        <pc:picChg chg="mod">
+          <ac:chgData name="Bellu, Gowri Shanker" userId="e4b71a44-d6f9-4d3b-9b6e-2cadb6b1c0ec" providerId="ADAL" clId="{5FC56B7B-2AE1-48C6-AAA3-019F1F6B3F19}" dt="2026-02-03T08:52:23.412" v="0" actId="1076"/>
+          <ac:picMkLst>
+            <pc:docMk/>
+            <pc:sldMk cId="546536083" sldId="256"/>
+            <ac:picMk id="37" creationId="{9513B8D2-3640-F89C-ACBE-7A5653E6BB50}"/>
+          </ac:picMkLst>
+        </pc:picChg>
+        <pc:picChg chg="mod">
+          <ac:chgData name="Bellu, Gowri Shanker" userId="e4b71a44-d6f9-4d3b-9b6e-2cadb6b1c0ec" providerId="ADAL" clId="{5FC56B7B-2AE1-48C6-AAA3-019F1F6B3F19}" dt="2026-02-03T08:52:23.412" v="0" actId="1076"/>
+          <ac:picMkLst>
+            <pc:docMk/>
+            <pc:sldMk cId="546536083" sldId="256"/>
+            <ac:picMk id="46" creationId="{58FA2869-5B23-EAE6-084C-98C2B578E1DC}"/>
+          </ac:picMkLst>
+        </pc:picChg>
+        <pc:picChg chg="mod">
+          <ac:chgData name="Bellu, Gowri Shanker" userId="e4b71a44-d6f9-4d3b-9b6e-2cadb6b1c0ec" providerId="ADAL" clId="{5FC56B7B-2AE1-48C6-AAA3-019F1F6B3F19}" dt="2026-02-03T08:52:23.412" v="0" actId="1076"/>
+          <ac:picMkLst>
+            <pc:docMk/>
+            <pc:sldMk cId="546536083" sldId="256"/>
+            <ac:picMk id="50" creationId="{387735B0-453E-A67C-BF96-B44CFBD77446}"/>
+          </ac:picMkLst>
+        </pc:picChg>
+        <pc:picChg chg="mod">
+          <ac:chgData name="Bellu, Gowri Shanker" userId="e4b71a44-d6f9-4d3b-9b6e-2cadb6b1c0ec" providerId="ADAL" clId="{5FC56B7B-2AE1-48C6-AAA3-019F1F6B3F19}" dt="2026-02-03T08:52:23.412" v="0" actId="1076"/>
+          <ac:picMkLst>
+            <pc:docMk/>
+            <pc:sldMk cId="546536083" sldId="256"/>
+            <ac:picMk id="53" creationId="{855C3B6B-C3FD-E1E4-DAE1-C0C8CFFDFAAC}"/>
+          </ac:picMkLst>
+        </pc:picChg>
+      </pc:sldChg>
+    </pc:docChg>
+  </pc:docChgLst>
+</pc:chgInfo>
 </file>
 
 <file path=ppt/slideLayouts/slideLayout1.xml><?xml version="1.0" encoding="utf-8"?>
@@ -498,7 +628,7 @@
         </p:blipFill>
         <p:spPr>
           <a:xfrm>
-            <a:off x="6026128" y="5888804"/>
+            <a:off x="2208107" y="5600047"/>
             <a:ext cx="309044" cy="309044"/>
           </a:xfrm>
           <a:prstGeom prst="rect">
@@ -534,7 +664,7 @@
         </p:blipFill>
         <p:spPr>
           <a:xfrm>
-            <a:off x="4507944" y="5905280"/>
+            <a:off x="689923" y="5616523"/>
             <a:ext cx="309044" cy="309044"/>
           </a:xfrm>
           <a:prstGeom prst="rect">
@@ -570,7 +700,7 @@
         </p:blipFill>
         <p:spPr>
           <a:xfrm>
-            <a:off x="5934218" y="4717574"/>
+            <a:off x="2116197" y="4428817"/>
             <a:ext cx="319243" cy="319243"/>
           </a:xfrm>
           <a:prstGeom prst="rect">
@@ -606,7 +736,7 @@
         </p:blipFill>
         <p:spPr>
           <a:xfrm>
-            <a:off x="5103880" y="4705502"/>
+            <a:off x="1285859" y="4416745"/>
             <a:ext cx="319243" cy="319243"/>
           </a:xfrm>
           <a:prstGeom prst="rect">
@@ -642,7 +772,7 @@
         </p:blipFill>
         <p:spPr>
           <a:xfrm>
-            <a:off x="5866507" y="1722442"/>
+            <a:off x="2048486" y="1433685"/>
             <a:ext cx="319243" cy="319243"/>
           </a:xfrm>
           <a:prstGeom prst="rect">
@@ -678,7 +808,7 @@
         </p:blipFill>
         <p:spPr>
           <a:xfrm>
-            <a:off x="4326883" y="4705503"/>
+            <a:off x="508862" y="4416746"/>
             <a:ext cx="319243" cy="319243"/>
           </a:xfrm>
           <a:prstGeom prst="rect">
@@ -714,7 +844,7 @@
         </p:blipFill>
         <p:spPr>
           <a:xfrm>
-            <a:off x="5817634" y="2462189"/>
+            <a:off x="1999613" y="2173432"/>
             <a:ext cx="319243" cy="319243"/>
           </a:xfrm>
           <a:prstGeom prst="rect">
@@ -750,7 +880,7 @@
         </p:blipFill>
         <p:spPr>
           <a:xfrm>
-            <a:off x="5127843" y="2420739"/>
+            <a:off x="1309822" y="2131982"/>
             <a:ext cx="319243" cy="319243"/>
           </a:xfrm>
           <a:prstGeom prst="rect">
@@ -786,7 +916,7 @@
         </p:blipFill>
         <p:spPr>
           <a:xfrm>
-            <a:off x="4309693" y="2420739"/>
+            <a:off x="491672" y="2131982"/>
             <a:ext cx="319243" cy="319243"/>
           </a:xfrm>
           <a:prstGeom prst="rect">
@@ -822,7 +952,7 @@
         </p:blipFill>
         <p:spPr>
           <a:xfrm>
-            <a:off x="5115506" y="1684804"/>
+            <a:off x="1297485" y="1396047"/>
             <a:ext cx="319243" cy="319243"/>
           </a:xfrm>
           <a:prstGeom prst="rect">
@@ -858,7 +988,7 @@
         </p:blipFill>
         <p:spPr>
           <a:xfrm>
-            <a:off x="4284462" y="1704047"/>
+            <a:off x="466441" y="1415290"/>
             <a:ext cx="319243" cy="319243"/>
           </a:xfrm>
           <a:prstGeom prst="rect">
@@ -894,7 +1024,7 @@
         </p:blipFill>
         <p:spPr>
           <a:xfrm>
-            <a:off x="5884103" y="927747"/>
+            <a:off x="2066082" y="638990"/>
             <a:ext cx="319243" cy="319243"/>
           </a:xfrm>
           <a:prstGeom prst="rect">
@@ -930,7 +1060,7 @@
         </p:blipFill>
         <p:spPr>
           <a:xfrm>
-            <a:off x="5103880" y="918805"/>
+            <a:off x="1285859" y="630048"/>
             <a:ext cx="319243" cy="319243"/>
           </a:xfrm>
           <a:prstGeom prst="rect">
@@ -966,7 +1096,7 @@
         </p:blipFill>
         <p:spPr>
           <a:xfrm>
-            <a:off x="4309694" y="949286"/>
+            <a:off x="491673" y="660529"/>
             <a:ext cx="319243" cy="319243"/>
           </a:xfrm>
           <a:prstGeom prst="rect">
@@ -1002,7 +1132,7 @@
         </p:blipFill>
         <p:spPr>
           <a:xfrm>
-            <a:off x="4330134" y="3227003"/>
+            <a:off x="512113" y="2938246"/>
             <a:ext cx="278360" cy="278360"/>
           </a:xfrm>
           <a:prstGeom prst="rect">
@@ -1038,7 +1168,7 @@
         </p:blipFill>
         <p:spPr>
           <a:xfrm>
-            <a:off x="5144682" y="3188439"/>
+            <a:off x="1326661" y="2899682"/>
             <a:ext cx="319243" cy="319243"/>
           </a:xfrm>
           <a:prstGeom prst="rect">
@@ -1074,7 +1204,7 @@
         </p:blipFill>
         <p:spPr>
           <a:xfrm>
-            <a:off x="5882714" y="3186120"/>
+            <a:off x="2064693" y="2897363"/>
             <a:ext cx="319243" cy="319243"/>
           </a:xfrm>
           <a:prstGeom prst="rect">
@@ -1110,7 +1240,7 @@
         </p:blipFill>
         <p:spPr>
           <a:xfrm>
-            <a:off x="4347337" y="3977054"/>
+            <a:off x="529316" y="3688297"/>
             <a:ext cx="359403" cy="359403"/>
           </a:xfrm>
           <a:prstGeom prst="rect">
@@ -1146,7 +1276,7 @@
         </p:blipFill>
         <p:spPr>
           <a:xfrm>
-            <a:off x="5155842" y="3928642"/>
+            <a:off x="1337821" y="3639885"/>
             <a:ext cx="359403" cy="359403"/>
           </a:xfrm>
           <a:prstGeom prst="rect">
@@ -1182,7 +1312,7 @@
         </p:blipFill>
         <p:spPr>
           <a:xfrm>
-            <a:off x="6552613" y="892235"/>
+            <a:off x="2734592" y="603478"/>
             <a:ext cx="131795" cy="131795"/>
           </a:xfrm>
           <a:prstGeom prst="rect">
@@ -1218,7 +1348,7 @@
         </p:blipFill>
         <p:spPr>
           <a:xfrm>
-            <a:off x="6555091" y="4275487"/>
+            <a:off x="2737070" y="3986730"/>
             <a:ext cx="131795" cy="131795"/>
           </a:xfrm>
           <a:prstGeom prst="rect">
@@ -1254,7 +1384,7 @@
         </p:blipFill>
         <p:spPr>
           <a:xfrm>
-            <a:off x="6552613" y="1458859"/>
+            <a:off x="2734592" y="1170102"/>
             <a:ext cx="131795" cy="131795"/>
           </a:xfrm>
           <a:prstGeom prst="rect">
@@ -1290,7 +1420,7 @@
         </p:blipFill>
         <p:spPr>
           <a:xfrm>
-            <a:off x="6567794" y="2214262"/>
+            <a:off x="2749773" y="1925505"/>
             <a:ext cx="131795" cy="131795"/>
           </a:xfrm>
           <a:prstGeom prst="rect">
@@ -1326,7 +1456,7 @@
         </p:blipFill>
         <p:spPr>
           <a:xfrm>
-            <a:off x="6567794" y="3168252"/>
+            <a:off x="2749773" y="2879495"/>
             <a:ext cx="131795" cy="131795"/>
           </a:xfrm>
           <a:prstGeom prst="rect">
@@ -1362,7 +1492,7 @@
         </p:blipFill>
         <p:spPr>
           <a:xfrm>
-            <a:off x="6557942" y="5061763"/>
+            <a:off x="2739921" y="4773006"/>
             <a:ext cx="131795" cy="131795"/>
           </a:xfrm>
           <a:prstGeom prst="rect">
@@ -1398,7 +1528,7 @@
         </p:blipFill>
         <p:spPr>
           <a:xfrm>
-            <a:off x="5905556" y="4001466"/>
+            <a:off x="2087535" y="3712709"/>
             <a:ext cx="330982" cy="330982"/>
           </a:xfrm>
           <a:prstGeom prst="rect">
@@ -1434,8 +1564,80 @@
         </p:blipFill>
         <p:spPr>
           <a:xfrm>
-            <a:off x="5215398" y="5875648"/>
+            <a:off x="1397377" y="5586891"/>
             <a:ext cx="335357" cy="335357"/>
+          </a:xfrm>
+          <a:prstGeom prst="rect">
+            <a:avLst/>
+          </a:prstGeom>
+        </p:spPr>
+      </p:pic>
+      <p:pic>
+        <p:nvPicPr>
+          <p:cNvPr id="3" name="Graphic 2" descr="Boardroom with solid fill">
+            <a:extLst>
+              <a:ext uri="{FF2B5EF4-FFF2-40B4-BE49-F238E27FC236}">
+                <a16:creationId xmlns:a16="http://schemas.microsoft.com/office/drawing/2014/main" id="{A0294671-1C96-3E1D-4393-0B41C7F16D1A}"/>
+              </a:ext>
+            </a:extLst>
+          </p:cNvPr>
+          <p:cNvPicPr>
+            <a:picLocks noChangeAspect="1"/>
+          </p:cNvPicPr>
+          <p:nvPr/>
+        </p:nvPicPr>
+        <p:blipFill>
+          <a:blip r:embed="rId50">
+            <a:extLst>
+              <a:ext uri="{96DAC541-7B7A-43D3-8B79-37D633B846F1}">
+                <asvg:svgBlip xmlns:asvg="http://schemas.microsoft.com/office/drawing/2016/SVG/main" r:embed="rId51"/>
+              </a:ext>
+            </a:extLst>
+          </a:blip>
+          <a:stretch>
+            <a:fillRect/>
+          </a:stretch>
+        </p:blipFill>
+        <p:spPr>
+          <a:xfrm>
+            <a:off x="5382126" y="4045477"/>
+            <a:ext cx="914400" cy="914400"/>
+          </a:xfrm>
+          <a:prstGeom prst="rect">
+            <a:avLst/>
+          </a:prstGeom>
+        </p:spPr>
+      </p:pic>
+      <p:pic>
+        <p:nvPicPr>
+          <p:cNvPr id="5" name="Graphic 4" descr="Email with solid fill">
+            <a:extLst>
+              <a:ext uri="{FF2B5EF4-FFF2-40B4-BE49-F238E27FC236}">
+                <a16:creationId xmlns:a16="http://schemas.microsoft.com/office/drawing/2014/main" id="{22E0B9E7-CAF3-9B8E-E3C8-8207F420AF07}"/>
+              </a:ext>
+            </a:extLst>
+          </p:cNvPr>
+          <p:cNvPicPr>
+            <a:picLocks noChangeAspect="1"/>
+          </p:cNvPicPr>
+          <p:nvPr/>
+        </p:nvPicPr>
+        <p:blipFill>
+          <a:blip r:embed="rId52">
+            <a:extLst>
+              <a:ext uri="{96DAC541-7B7A-43D3-8B79-37D633B846F1}">
+                <asvg:svgBlip xmlns:asvg="http://schemas.microsoft.com/office/drawing/2016/SVG/main" r:embed="rId53"/>
+              </a:ext>
+            </a:extLst>
+          </a:blip>
+          <a:stretch>
+            <a:fillRect/>
+          </a:stretch>
+        </p:blipFill>
+        <p:spPr>
+          <a:xfrm>
+            <a:off x="5013158" y="2894150"/>
+            <a:ext cx="914400" cy="914400"/>
           </a:xfrm>
           <a:prstGeom prst="rect">
             <a:avLst/>

</xml_diff>

<commit_message>
Audio support for the sadhana; Cleaned up settings through JSON file.
</commit_message>
<xml_diff>
--- a/icons/icons.pptx
+++ b/icons/icons.pptx
@@ -115,7 +115,7 @@
 <file path=ppt/revisionInfo.xml><?xml version="1.0" encoding="utf-8"?>
 <p1510:revInfo xmlns:a="http://schemas.openxmlformats.org/drawingml/2006/main" xmlns:r="http://schemas.openxmlformats.org/officeDocument/2006/relationships" xmlns:p1510="http://schemas.microsoft.com/office/powerpoint/2015/10/main">
   <p1510:revLst>
-    <p1510:client id="{2A5AC9F9-D974-459D-82EB-E85FE98BCB28}" v="2" dt="2026-02-03T08:55:05.447"/>
+    <p1510:client id="{872F35E0-1313-46D6-B4C7-ED7D08287D3C}" v="10" dt="2026-02-06T12:34:02.029"/>
   </p1510:revLst>
 </p1510:revInfo>
 </file>
@@ -229,6 +229,110 @@
             <pc:docMk/>
             <pc:sldMk cId="546536083" sldId="256"/>
             <ac:picMk id="53" creationId="{855C3B6B-C3FD-E1E4-DAE1-C0C8CFFDFAAC}"/>
+          </ac:picMkLst>
+        </pc:picChg>
+      </pc:sldChg>
+    </pc:docChg>
+  </pc:docChgLst>
+  <pc:docChgLst>
+    <pc:chgData name="Bellu, Gowri Shanker" userId="e4b71a44-d6f9-4d3b-9b6e-2cadb6b1c0ec" providerId="ADAL" clId="{FEB7CA39-640E-4000-BF80-FEADB700006F}"/>
+    <pc:docChg chg="modSld">
+      <pc:chgData name="Bellu, Gowri Shanker" userId="e4b71a44-d6f9-4d3b-9b6e-2cadb6b1c0ec" providerId="ADAL" clId="{FEB7CA39-640E-4000-BF80-FEADB700006F}" dt="2026-02-06T12:34:04.386" v="20" actId="1076"/>
+      <pc:docMkLst>
+        <pc:docMk/>
+      </pc:docMkLst>
+      <pc:sldChg chg="addSp modSp mod">
+        <pc:chgData name="Bellu, Gowri Shanker" userId="e4b71a44-d6f9-4d3b-9b6e-2cadb6b1c0ec" providerId="ADAL" clId="{FEB7CA39-640E-4000-BF80-FEADB700006F}" dt="2026-02-06T12:34:04.386" v="20" actId="1076"/>
+        <pc:sldMkLst>
+          <pc:docMk/>
+          <pc:sldMk cId="546536083" sldId="256"/>
+        </pc:sldMkLst>
+        <pc:picChg chg="add mod">
+          <ac:chgData name="Bellu, Gowri Shanker" userId="e4b71a44-d6f9-4d3b-9b6e-2cadb6b1c0ec" providerId="ADAL" clId="{FEB7CA39-640E-4000-BF80-FEADB700006F}" dt="2026-02-06T12:24:37.391" v="1" actId="1076"/>
+          <ac:picMkLst>
+            <pc:docMk/>
+            <pc:sldMk cId="546536083" sldId="256"/>
+            <ac:picMk id="4" creationId="{68A06556-9434-70C6-11AA-D77D2DBBA307}"/>
+          </ac:picMkLst>
+        </pc:picChg>
+        <pc:picChg chg="mod">
+          <ac:chgData name="Bellu, Gowri Shanker" userId="e4b71a44-d6f9-4d3b-9b6e-2cadb6b1c0ec" providerId="ADAL" clId="{FEB7CA39-640E-4000-BF80-FEADB700006F}" dt="2026-02-06T12:24:39.995" v="2" actId="1076"/>
+          <ac:picMkLst>
+            <pc:docMk/>
+            <pc:sldMk cId="546536083" sldId="256"/>
+            <ac:picMk id="5" creationId="{22E0B9E7-CAF3-9B8E-E3C8-8207F420AF07}"/>
+          </ac:picMkLst>
+        </pc:picChg>
+        <pc:picChg chg="add mod">
+          <ac:chgData name="Bellu, Gowri Shanker" userId="e4b71a44-d6f9-4d3b-9b6e-2cadb6b1c0ec" providerId="ADAL" clId="{FEB7CA39-640E-4000-BF80-FEADB700006F}" dt="2026-02-06T12:26:13.777" v="4" actId="1076"/>
+          <ac:picMkLst>
+            <pc:docMk/>
+            <pc:sldMk cId="546536083" sldId="256"/>
+            <ac:picMk id="7" creationId="{0B658666-26EC-AE1E-4A7A-44C354B70C0C}"/>
+          </ac:picMkLst>
+        </pc:picChg>
+        <pc:picChg chg="add mod">
+          <ac:chgData name="Bellu, Gowri Shanker" userId="e4b71a44-d6f9-4d3b-9b6e-2cadb6b1c0ec" providerId="ADAL" clId="{FEB7CA39-640E-4000-BF80-FEADB700006F}" dt="2026-02-06T12:26:36.919" v="6" actId="1076"/>
+          <ac:picMkLst>
+            <pc:docMk/>
+            <pc:sldMk cId="546536083" sldId="256"/>
+            <ac:picMk id="11" creationId="{B0FC902E-4467-BDCD-C3DB-C73F24E4B620}"/>
+          </ac:picMkLst>
+        </pc:picChg>
+        <pc:picChg chg="add mod">
+          <ac:chgData name="Bellu, Gowri Shanker" userId="e4b71a44-d6f9-4d3b-9b6e-2cadb6b1c0ec" providerId="ADAL" clId="{FEB7CA39-640E-4000-BF80-FEADB700006F}" dt="2026-02-06T12:29:32.923" v="11" actId="1076"/>
+          <ac:picMkLst>
+            <pc:docMk/>
+            <pc:sldMk cId="546536083" sldId="256"/>
+            <ac:picMk id="13" creationId="{4E9D4DE8-B023-F973-9B67-260B100D0AF4}"/>
+          </ac:picMkLst>
+        </pc:picChg>
+        <pc:picChg chg="add mod">
+          <ac:chgData name="Bellu, Gowri Shanker" userId="e4b71a44-d6f9-4d3b-9b6e-2cadb6b1c0ec" providerId="ADAL" clId="{FEB7CA39-640E-4000-BF80-FEADB700006F}" dt="2026-02-06T12:29:01.662" v="9" actId="1076"/>
+          <ac:picMkLst>
+            <pc:docMk/>
+            <pc:sldMk cId="546536083" sldId="256"/>
+            <ac:picMk id="27" creationId="{39F34591-7610-CABD-9F10-7A015B0EFBB5}"/>
+          </ac:picMkLst>
+        </pc:picChg>
+        <pc:picChg chg="add mod">
+          <ac:chgData name="Bellu, Gowri Shanker" userId="e4b71a44-d6f9-4d3b-9b6e-2cadb6b1c0ec" providerId="ADAL" clId="{FEB7CA39-640E-4000-BF80-FEADB700006F}" dt="2026-02-06T12:29:34.755" v="12" actId="1076"/>
+          <ac:picMkLst>
+            <pc:docMk/>
+            <pc:sldMk cId="546536083" sldId="256"/>
+            <ac:picMk id="29" creationId="{24D0C927-4820-CC92-ED8F-9692E64B6790}"/>
+          </ac:picMkLst>
+        </pc:picChg>
+        <pc:picChg chg="add mod">
+          <ac:chgData name="Bellu, Gowri Shanker" userId="e4b71a44-d6f9-4d3b-9b6e-2cadb6b1c0ec" providerId="ADAL" clId="{FEB7CA39-640E-4000-BF80-FEADB700006F}" dt="2026-02-06T12:31:38.160" v="14" actId="1076"/>
+          <ac:picMkLst>
+            <pc:docMk/>
+            <pc:sldMk cId="546536083" sldId="256"/>
+            <ac:picMk id="31" creationId="{B508F49C-CC50-F08A-C3CF-5597021447B0}"/>
+          </ac:picMkLst>
+        </pc:picChg>
+        <pc:picChg chg="add mod">
+          <ac:chgData name="Bellu, Gowri Shanker" userId="e4b71a44-d6f9-4d3b-9b6e-2cadb6b1c0ec" providerId="ADAL" clId="{FEB7CA39-640E-4000-BF80-FEADB700006F}" dt="2026-02-06T12:32:40.551" v="16" actId="1076"/>
+          <ac:picMkLst>
+            <pc:docMk/>
+            <pc:sldMk cId="546536083" sldId="256"/>
+            <ac:picMk id="33" creationId="{219C973E-3049-4924-0C70-8315BDB6B422}"/>
+          </ac:picMkLst>
+        </pc:picChg>
+        <pc:picChg chg="add mod">
+          <ac:chgData name="Bellu, Gowri Shanker" userId="e4b71a44-d6f9-4d3b-9b6e-2cadb6b1c0ec" providerId="ADAL" clId="{FEB7CA39-640E-4000-BF80-FEADB700006F}" dt="2026-02-06T12:33:16.764" v="18" actId="1076"/>
+          <ac:picMkLst>
+            <pc:docMk/>
+            <pc:sldMk cId="546536083" sldId="256"/>
+            <ac:picMk id="38" creationId="{1455C76B-E3DB-227A-0564-613DD71C28F9}"/>
+          </ac:picMkLst>
+        </pc:picChg>
+        <pc:picChg chg="add mod">
+          <ac:chgData name="Bellu, Gowri Shanker" userId="e4b71a44-d6f9-4d3b-9b6e-2cadb6b1c0ec" providerId="ADAL" clId="{FEB7CA39-640E-4000-BF80-FEADB700006F}" dt="2026-02-06T12:34:04.386" v="20" actId="1076"/>
+          <ac:picMkLst>
+            <pc:docMk/>
+            <pc:sldMk cId="546536083" sldId="256"/>
+            <ac:picMk id="40" creationId="{6EB9268E-A32B-1877-4B0A-0DDEB8CAB9EC}"/>
           </ac:picMkLst>
         </pc:picChg>
       </pc:sldChg>
@@ -1636,7 +1740,367 @@
         </p:blipFill>
         <p:spPr>
           <a:xfrm>
-            <a:off x="5013158" y="2894150"/>
+            <a:off x="4222220" y="4672491"/>
+            <a:ext cx="914400" cy="914400"/>
+          </a:xfrm>
+          <a:prstGeom prst="rect">
+            <a:avLst/>
+          </a:prstGeom>
+        </p:spPr>
+      </p:pic>
+      <p:pic>
+        <p:nvPicPr>
+          <p:cNvPr id="4" name="Graphic 3" descr="Comb with solid fill">
+            <a:extLst>
+              <a:ext uri="{FF2B5EF4-FFF2-40B4-BE49-F238E27FC236}">
+                <a16:creationId xmlns:a16="http://schemas.microsoft.com/office/drawing/2014/main" id="{68A06556-9434-70C6-11AA-D77D2DBBA307}"/>
+              </a:ext>
+            </a:extLst>
+          </p:cNvPr>
+          <p:cNvPicPr>
+            <a:picLocks noChangeAspect="1"/>
+          </p:cNvPicPr>
+          <p:nvPr/>
+        </p:nvPicPr>
+        <p:blipFill>
+          <a:blip r:embed="rId54">
+            <a:extLst>
+              <a:ext uri="{96DAC541-7B7A-43D3-8B79-37D633B846F1}">
+                <asvg:svgBlip xmlns:asvg="http://schemas.microsoft.com/office/drawing/2016/SVG/main" r:embed="rId55"/>
+              </a:ext>
+            </a:extLst>
+          </a:blip>
+          <a:stretch>
+            <a:fillRect/>
+          </a:stretch>
+        </p:blipFill>
+        <p:spPr>
+          <a:xfrm>
+            <a:off x="5391958" y="650181"/>
+            <a:ext cx="914400" cy="914400"/>
+          </a:xfrm>
+          <a:prstGeom prst="rect">
+            <a:avLst/>
+          </a:prstGeom>
+        </p:spPr>
+      </p:pic>
+      <p:pic>
+        <p:nvPicPr>
+          <p:cNvPr id="7" name="Graphic 6" descr="Hammock with solid fill">
+            <a:extLst>
+              <a:ext uri="{FF2B5EF4-FFF2-40B4-BE49-F238E27FC236}">
+                <a16:creationId xmlns:a16="http://schemas.microsoft.com/office/drawing/2014/main" id="{0B658666-26EC-AE1E-4A7A-44C354B70C0C}"/>
+              </a:ext>
+            </a:extLst>
+          </p:cNvPr>
+          <p:cNvPicPr>
+            <a:picLocks noChangeAspect="1"/>
+          </p:cNvPicPr>
+          <p:nvPr/>
+        </p:nvPicPr>
+        <p:blipFill>
+          <a:blip r:embed="rId56">
+            <a:extLst>
+              <a:ext uri="{96DAC541-7B7A-43D3-8B79-37D633B846F1}">
+                <asvg:svgBlip xmlns:asvg="http://schemas.microsoft.com/office/drawing/2016/SVG/main" r:embed="rId57"/>
+              </a:ext>
+            </a:extLst>
+          </a:blip>
+          <a:stretch>
+            <a:fillRect/>
+          </a:stretch>
+        </p:blipFill>
+        <p:spPr>
+          <a:xfrm>
+            <a:off x="6612194" y="2224543"/>
+            <a:ext cx="914400" cy="914400"/>
+          </a:xfrm>
+          <a:prstGeom prst="rect">
+            <a:avLst/>
+          </a:prstGeom>
+        </p:spPr>
+      </p:pic>
+      <p:pic>
+        <p:nvPicPr>
+          <p:cNvPr id="11" name="Graphic 10" descr="Hang Loose Hand Gesture with solid fill">
+            <a:extLst>
+              <a:ext uri="{FF2B5EF4-FFF2-40B4-BE49-F238E27FC236}">
+                <a16:creationId xmlns:a16="http://schemas.microsoft.com/office/drawing/2014/main" id="{B0FC902E-4467-BDCD-C3DB-C73F24E4B620}"/>
+              </a:ext>
+            </a:extLst>
+          </p:cNvPr>
+          <p:cNvPicPr>
+            <a:picLocks noChangeAspect="1"/>
+          </p:cNvPicPr>
+          <p:nvPr/>
+        </p:nvPicPr>
+        <p:blipFill>
+          <a:blip r:embed="rId58">
+            <a:extLst>
+              <a:ext uri="{96DAC541-7B7A-43D3-8B79-37D633B846F1}">
+                <asvg:svgBlip xmlns:asvg="http://schemas.microsoft.com/office/drawing/2016/SVG/main" r:embed="rId59"/>
+              </a:ext>
+            </a:extLst>
+          </a:blip>
+          <a:stretch>
+            <a:fillRect/>
+          </a:stretch>
+        </p:blipFill>
+        <p:spPr>
+          <a:xfrm>
+            <a:off x="4255598" y="1011105"/>
+            <a:ext cx="914400" cy="914400"/>
+          </a:xfrm>
+          <a:prstGeom prst="rect">
+            <a:avLst/>
+          </a:prstGeom>
+        </p:spPr>
+      </p:pic>
+      <p:pic>
+        <p:nvPicPr>
+          <p:cNvPr id="13" name="Graphic 12" descr="Road with solid fill">
+            <a:extLst>
+              <a:ext uri="{FF2B5EF4-FFF2-40B4-BE49-F238E27FC236}">
+                <a16:creationId xmlns:a16="http://schemas.microsoft.com/office/drawing/2014/main" id="{4E9D4DE8-B023-F973-9B67-260B100D0AF4}"/>
+              </a:ext>
+            </a:extLst>
+          </p:cNvPr>
+          <p:cNvPicPr>
+            <a:picLocks noChangeAspect="1"/>
+          </p:cNvPicPr>
+          <p:nvPr/>
+        </p:nvPicPr>
+        <p:blipFill>
+          <a:blip r:embed="rId60">
+            <a:extLst>
+              <a:ext uri="{96DAC541-7B7A-43D3-8B79-37D633B846F1}">
+                <asvg:svgBlip xmlns:asvg="http://schemas.microsoft.com/office/drawing/2016/SVG/main" r:embed="rId61"/>
+              </a:ext>
+            </a:extLst>
+          </a:blip>
+          <a:stretch>
+            <a:fillRect/>
+          </a:stretch>
+        </p:blipFill>
+        <p:spPr>
+          <a:xfrm>
+            <a:off x="8313174" y="2554090"/>
+            <a:ext cx="914400" cy="914400"/>
+          </a:xfrm>
+          <a:prstGeom prst="rect">
+            <a:avLst/>
+          </a:prstGeom>
+        </p:spPr>
+      </p:pic>
+      <p:pic>
+        <p:nvPicPr>
+          <p:cNvPr id="27" name="Graphic 26" descr="Popcorn with solid fill">
+            <a:extLst>
+              <a:ext uri="{FF2B5EF4-FFF2-40B4-BE49-F238E27FC236}">
+                <a16:creationId xmlns:a16="http://schemas.microsoft.com/office/drawing/2014/main" id="{39F34591-7610-CABD-9F10-7A015B0EFBB5}"/>
+              </a:ext>
+            </a:extLst>
+          </p:cNvPr>
+          <p:cNvPicPr>
+            <a:picLocks noChangeAspect="1"/>
+          </p:cNvPicPr>
+          <p:nvPr/>
+        </p:nvPicPr>
+        <p:blipFill>
+          <a:blip r:embed="rId62">
+            <a:extLst>
+              <a:ext uri="{96DAC541-7B7A-43D3-8B79-37D633B846F1}">
+                <asvg:svgBlip xmlns:asvg="http://schemas.microsoft.com/office/drawing/2016/SVG/main" r:embed="rId63"/>
+              </a:ext>
+            </a:extLst>
+          </a:blip>
+          <a:stretch>
+            <a:fillRect/>
+          </a:stretch>
+        </p:blipFill>
+        <p:spPr>
+          <a:xfrm>
+            <a:off x="7152968" y="3542088"/>
+            <a:ext cx="914400" cy="914400"/>
+          </a:xfrm>
+          <a:prstGeom prst="rect">
+            <a:avLst/>
+          </a:prstGeom>
+        </p:spPr>
+      </p:pic>
+      <p:pic>
+        <p:nvPicPr>
+          <p:cNvPr id="29" name="Graphic 28" descr="Video camera with solid fill">
+            <a:extLst>
+              <a:ext uri="{FF2B5EF4-FFF2-40B4-BE49-F238E27FC236}">
+                <a16:creationId xmlns:a16="http://schemas.microsoft.com/office/drawing/2014/main" id="{24D0C927-4820-CC92-ED8F-9692E64B6790}"/>
+              </a:ext>
+            </a:extLst>
+          </p:cNvPr>
+          <p:cNvPicPr>
+            <a:picLocks noChangeAspect="1"/>
+          </p:cNvPicPr>
+          <p:nvPr/>
+        </p:nvPicPr>
+        <p:blipFill>
+          <a:blip r:embed="rId64">
+            <a:extLst>
+              <a:ext uri="{96DAC541-7B7A-43D3-8B79-37D633B846F1}">
+                <asvg:svgBlip xmlns:asvg="http://schemas.microsoft.com/office/drawing/2016/SVG/main" r:embed="rId65"/>
+              </a:ext>
+            </a:extLst>
+          </a:blip>
+          <a:stretch>
+            <a:fillRect/>
+          </a:stretch>
+        </p:blipFill>
+        <p:spPr>
+          <a:xfrm>
+            <a:off x="4328542" y="2659781"/>
+            <a:ext cx="914400" cy="914400"/>
+          </a:xfrm>
+          <a:prstGeom prst="rect">
+            <a:avLst/>
+          </a:prstGeom>
+        </p:spPr>
+      </p:pic>
+      <p:pic>
+        <p:nvPicPr>
+          <p:cNvPr id="31" name="Graphic 30" descr="Television with solid fill">
+            <a:extLst>
+              <a:ext uri="{FF2B5EF4-FFF2-40B4-BE49-F238E27FC236}">
+                <a16:creationId xmlns:a16="http://schemas.microsoft.com/office/drawing/2014/main" id="{B508F49C-CC50-F08A-C3CF-5597021447B0}"/>
+              </a:ext>
+            </a:extLst>
+          </p:cNvPr>
+          <p:cNvPicPr>
+            <a:picLocks noChangeAspect="1"/>
+          </p:cNvPicPr>
+          <p:nvPr/>
+        </p:nvPicPr>
+        <p:blipFill>
+          <a:blip r:embed="rId66">
+            <a:extLst>
+              <a:ext uri="{96DAC541-7B7A-43D3-8B79-37D633B846F1}">
+                <asvg:svgBlip xmlns:asvg="http://schemas.microsoft.com/office/drawing/2016/SVG/main" r:embed="rId67"/>
+              </a:ext>
+            </a:extLst>
+          </a:blip>
+          <a:stretch>
+            <a:fillRect/>
+          </a:stretch>
+        </p:blipFill>
+        <p:spPr>
+          <a:xfrm>
+            <a:off x="7981446" y="1217582"/>
+            <a:ext cx="914400" cy="914400"/>
+          </a:xfrm>
+          <a:prstGeom prst="rect">
+            <a:avLst/>
+          </a:prstGeom>
+        </p:spPr>
+      </p:pic>
+      <p:pic>
+        <p:nvPicPr>
+          <p:cNvPr id="33" name="Graphic 32" descr="Headphones with solid fill">
+            <a:extLst>
+              <a:ext uri="{FF2B5EF4-FFF2-40B4-BE49-F238E27FC236}">
+                <a16:creationId xmlns:a16="http://schemas.microsoft.com/office/drawing/2014/main" id="{219C973E-3049-4924-0C70-8315BDB6B422}"/>
+              </a:ext>
+            </a:extLst>
+          </p:cNvPr>
+          <p:cNvPicPr>
+            <a:picLocks noChangeAspect="1"/>
+          </p:cNvPicPr>
+          <p:nvPr/>
+        </p:nvPicPr>
+        <p:blipFill>
+          <a:blip r:embed="rId68">
+            <a:extLst>
+              <a:ext uri="{96DAC541-7B7A-43D3-8B79-37D633B846F1}">
+                <asvg:svgBlip xmlns:asvg="http://schemas.microsoft.com/office/drawing/2016/SVG/main" r:embed="rId69"/>
+              </a:ext>
+            </a:extLst>
+          </a:blip>
+          <a:stretch>
+            <a:fillRect/>
+          </a:stretch>
+        </p:blipFill>
+        <p:spPr>
+          <a:xfrm>
+            <a:off x="7300452" y="5010323"/>
+            <a:ext cx="914400" cy="914400"/>
+          </a:xfrm>
+          <a:prstGeom prst="rect">
+            <a:avLst/>
+          </a:prstGeom>
+        </p:spPr>
+      </p:pic>
+      <p:pic>
+        <p:nvPicPr>
+          <p:cNvPr id="38" name="Graphic 37" descr="Web design with solid fill">
+            <a:extLst>
+              <a:ext uri="{FF2B5EF4-FFF2-40B4-BE49-F238E27FC236}">
+                <a16:creationId xmlns:a16="http://schemas.microsoft.com/office/drawing/2014/main" id="{1455C76B-E3DB-227A-0564-613DD71C28F9}"/>
+              </a:ext>
+            </a:extLst>
+          </p:cNvPr>
+          <p:cNvPicPr>
+            <a:picLocks noChangeAspect="1"/>
+          </p:cNvPicPr>
+          <p:nvPr/>
+        </p:nvPicPr>
+        <p:blipFill>
+          <a:blip r:embed="rId70">
+            <a:extLst>
+              <a:ext uri="{96DAC541-7B7A-43D3-8B79-37D633B846F1}">
+                <asvg:svgBlip xmlns:asvg="http://schemas.microsoft.com/office/drawing/2016/SVG/main" r:embed="rId71"/>
+              </a:ext>
+            </a:extLst>
+          </a:blip>
+          <a:stretch>
+            <a:fillRect/>
+          </a:stretch>
+        </p:blipFill>
+        <p:spPr>
+          <a:xfrm>
+            <a:off x="9243212" y="3805621"/>
+            <a:ext cx="914400" cy="914400"/>
+          </a:xfrm>
+          <a:prstGeom prst="rect">
+            <a:avLst/>
+          </a:prstGeom>
+        </p:spPr>
+      </p:pic>
+      <p:pic>
+        <p:nvPicPr>
+          <p:cNvPr id="40" name="Graphic 39" descr="Storytelling with solid fill">
+            <a:extLst>
+              <a:ext uri="{FF2B5EF4-FFF2-40B4-BE49-F238E27FC236}">
+                <a16:creationId xmlns:a16="http://schemas.microsoft.com/office/drawing/2014/main" id="{6EB9268E-A32B-1877-4B0A-0DDEB8CAB9EC}"/>
+              </a:ext>
+            </a:extLst>
+          </p:cNvPr>
+          <p:cNvPicPr>
+            <a:picLocks noChangeAspect="1"/>
+          </p:cNvPicPr>
+          <p:nvPr/>
+        </p:nvPicPr>
+        <p:blipFill>
+          <a:blip r:embed="rId72">
+            <a:extLst>
+              <a:ext uri="{96DAC541-7B7A-43D3-8B79-37D633B846F1}">
+                <asvg:svgBlip xmlns:asvg="http://schemas.microsoft.com/office/drawing/2016/SVG/main" r:embed="rId73"/>
+              </a:ext>
+            </a:extLst>
+          </a:blip>
+          <a:stretch>
+            <a:fillRect/>
+          </a:stretch>
+        </p:blipFill>
+        <p:spPr>
+          <a:xfrm>
+            <a:off x="9751040" y="1396047"/>
             <a:ext cx="914400" cy="914400"/>
           </a:xfrm>
           <a:prstGeom prst="rect">

</xml_diff>